<commit_message>
doing stupid shit fast
</commit_message>
<xml_diff>
--- a/Scrollvolution.pptx
+++ b/Scrollvolution.pptx
@@ -3742,6 +3742,30 @@
           </a:p>
         </p:txBody>
       </p:sp>
+      <p:pic>
+        <p:nvPicPr>
+          <p:cNvPr id="2" name="Grafik 1"/>
+          <p:cNvPicPr>
+            <a:picLocks noChangeAspect="1"/>
+          </p:cNvPicPr>
+          <p:nvPr/>
+        </p:nvPicPr>
+        <p:blipFill>
+          <a:blip r:embed="rId3"/>
+          <a:stretch>
+            <a:fillRect/>
+          </a:stretch>
+        </p:blipFill>
+        <p:spPr>
+          <a:xfrm>
+            <a:off x="1583668" y="476672"/>
+            <a:ext cx="5832648" cy="5844107"/>
+          </a:xfrm>
+          <a:prstGeom prst="rect">
+            <a:avLst/>
+          </a:prstGeom>
+        </p:spPr>
+      </p:pic>
     </p:spTree>
     <p:extLst>
       <p:ext uri="{BB962C8B-B14F-4D97-AF65-F5344CB8AC3E}">

</xml_diff>